<commit_message>
Finished Big Paper Summary; uploaded PDF
</commit_message>
<xml_diff>
--- a/Big Data/Bigtable Presentation.pptx
+++ b/Big Data/Bigtable Presentation.pptx
@@ -10,6 +10,10 @@
     <p:sldId id="258" r:id="rId4"/>
     <p:sldId id="259" r:id="rId5"/>
     <p:sldId id="260" r:id="rId6"/>
+    <p:sldId id="261" r:id="rId7"/>
+    <p:sldId id="262" r:id="rId8"/>
+    <p:sldId id="263" r:id="rId9"/>
+    <p:sldId id="264" r:id="rId10"/>
   </p:sldIdLst>
   <p:sldSz cx="12192000" cy="6858000"/>
   <p:notesSz cx="6858000" cy="9144000"/>
@@ -108,6 +112,11 @@
       </a:defRPr>
     </a:lvl9pPr>
   </p:defaultTextStyle>
+  <p:extLst>
+    <p:ext uri="{EFAFB233-063F-42B5-8137-9DF3F51BA10A}">
+      <p15:sldGuideLst xmlns:p15="http://schemas.microsoft.com/office/powerpoint/2012/main"/>
+    </p:ext>
+  </p:extLst>
 </p:presentation>
 </file>
 
@@ -5836,12 +5845,8 @@
           <a:p>
             <a:pPr algn="l"/>
             <a:r>
-              <a:rPr lang="en-US" sz="4000" u="sng" dirty="0" err="1" smtClean="0"/>
-              <a:t>Bigtable</a:t>
-            </a:r>
-            <a:r>
               <a:rPr lang="en-US" sz="4000" u="sng" dirty="0" smtClean="0"/>
-              <a:t>: A Distributed Storage </a:t>
+              <a:t>Bigtable: A Distributed Storage </a:t>
             </a:r>
             <a:br>
               <a:rPr lang="en-US" sz="4000" u="sng" dirty="0" smtClean="0"/>
@@ -6111,7 +6116,7 @@
           <a:p>
             <a:r>
               <a:rPr lang="en-US" sz="5000" dirty="0" smtClean="0"/>
-              <a:t>Big Table: The Main Idea</a:t>
+              <a:t>Bigtable: The Main Idea</a:t>
             </a:r>
             <a:endParaRPr lang="en-US" sz="5000" dirty="0"/>
           </a:p>
@@ -6134,22 +6139,13 @@
           <a:p>
             <a:r>
               <a:rPr lang="en-US" dirty="0" smtClean="0"/>
-              <a:t>In 2005, Google began created a distributed storage system that could scale up to petabytes of data. This system was known as </a:t>
-            </a:r>
-            <a:r>
-              <a:rPr lang="en-US" dirty="0" err="1" smtClean="0"/>
-              <a:t>Bigtable</a:t>
-            </a:r>
-            <a:endParaRPr lang="en-US" dirty="0" smtClean="0"/>
-          </a:p>
-          <a:p>
-            <a:r>
-              <a:rPr lang="en-US" dirty="0" err="1" smtClean="0"/>
-              <a:t>Bigtable</a:t>
-            </a:r>
+              <a:t>In 2005, Google began created a distributed storage system that could scale up to petabytes of data. This system was known as Bigtable</a:t>
+            </a:r>
+          </a:p>
+          <a:p>
             <a:r>
               <a:rPr lang="en-US" dirty="0" smtClean="0"/>
-              <a:t> is in use in over 60 Google produces and projects, including:</a:t>
+              <a:t>Bigtable is in use in over 60 Google produces and projects, including:</a:t>
             </a:r>
           </a:p>
           <a:p>
@@ -6169,13 +6165,8 @@
             <a:pPr lvl="1"/>
             <a:r>
               <a:rPr lang="en-US" dirty="0" smtClean="0"/>
-              <a:t>Clients receive a lot of flexibility when using </a:t>
-            </a:r>
-            <a:r>
-              <a:rPr lang="en-US" dirty="0" err="1" smtClean="0"/>
-              <a:t>Bigtable</a:t>
-            </a:r>
-            <a:endParaRPr lang="en-US" dirty="0" smtClean="0"/>
+              <a:t>Clients receive a lot of flexibility when using Bigtable</a:t>
+            </a:r>
           </a:p>
           <a:p>
             <a:r>
@@ -6241,8 +6232,12 @@
           <a:lstStyle/>
           <a:p>
             <a:r>
+              <a:rPr lang="en-US" sz="5000" dirty="0" smtClean="0"/>
+              <a:t>Bigtable</a:t>
+            </a:r>
+            <a:r>
               <a:rPr lang="en-US" sz="5000" dirty="0"/>
-              <a:t>Big Table: </a:t>
+              <a:t>: </a:t>
             </a:r>
             <a:r>
               <a:rPr lang="en-US" sz="5000" dirty="0" smtClean="0"/>
@@ -6271,15 +6266,7 @@
           <a:p>
             <a:r>
               <a:rPr lang="en-US" dirty="0" smtClean="0"/>
-              <a:t>At highest level of abstraction, </a:t>
-            </a:r>
-            <a:r>
-              <a:rPr lang="en-US" dirty="0" err="1" smtClean="0"/>
-              <a:t>Bigtable</a:t>
-            </a:r>
-            <a:r>
-              <a:rPr lang="en-US" dirty="0" smtClean="0"/>
-              <a:t> is a spare, distributed, persistent multidimensional sorted map</a:t>
+              <a:t>At highest level of abstraction, Bigtable is a spare, distributed, persistent multidimensional sorted map</a:t>
             </a:r>
           </a:p>
           <a:p>
@@ -6317,15 +6304,7 @@
           <a:p>
             <a:r>
               <a:rPr lang="en-US" dirty="0" smtClean="0"/>
-              <a:t>The </a:t>
-            </a:r>
-            <a:r>
-              <a:rPr lang="en-US" dirty="0" err="1" smtClean="0"/>
-              <a:t>Bigtable</a:t>
-            </a:r>
-            <a:r>
-              <a:rPr lang="en-US" dirty="0" smtClean="0"/>
-              <a:t> cluster is a cluster of a number of tables, who each consist of a set of tablets</a:t>
+              <a:t>The Bigtable cluster is a cluster of a number of tables, who each consist of a set of tablets</a:t>
             </a:r>
           </a:p>
           <a:p>
@@ -6402,8 +6381,12 @@
           <a:lstStyle/>
           <a:p>
             <a:r>
+              <a:rPr lang="en-US" sz="5000" dirty="0" smtClean="0"/>
+              <a:t>Bigtable</a:t>
+            </a:r>
+            <a:r>
               <a:rPr lang="en-US" sz="5000" dirty="0"/>
-              <a:t>Big Table: Implementation</a:t>
+              <a:t>: Implementation</a:t>
             </a:r>
           </a:p>
         </p:txBody>
@@ -6425,15 +6408,7 @@
           <a:p>
             <a:r>
               <a:rPr lang="en-US" dirty="0"/>
-              <a:t>Each table in the </a:t>
-            </a:r>
-            <a:r>
-              <a:rPr lang="en-US" dirty="0" err="1"/>
-              <a:t>Bigtable</a:t>
-            </a:r>
-            <a:r>
-              <a:rPr lang="en-US" dirty="0"/>
-              <a:t> cluster is a </a:t>
+              <a:t>Each table in the Bigtable cluster is a </a:t>
             </a:r>
             <a:r>
               <a:rPr lang="en-US" dirty="0" err="1"/>
@@ -6441,15 +6416,7 @@
             </a:r>
             <a:r>
               <a:rPr lang="en-US" dirty="0"/>
-              <a:t> file format, created by Google, to store </a:t>
-            </a:r>
-            <a:r>
-              <a:rPr lang="en-US" dirty="0" err="1"/>
-              <a:t>Bigtable</a:t>
-            </a:r>
-            <a:r>
-              <a:rPr lang="en-US" dirty="0"/>
-              <a:t> data</a:t>
+              <a:t> file format, created by Google, to store Bigtable data</a:t>
             </a:r>
           </a:p>
           <a:p>
@@ -6469,30 +6436,14 @@
           <a:p>
             <a:r>
               <a:rPr lang="en-US" dirty="0"/>
-              <a:t>Chubby, a highly-available and persistent distributed lock service, is used to check for reliability in the </a:t>
-            </a:r>
-            <a:r>
-              <a:rPr lang="en-US" dirty="0" err="1"/>
-              <a:t>Bigtable</a:t>
-            </a:r>
+              <a:t>Chubby, a highly-available and persistent distributed lock service, is used to check for reliability in the Bigtable cluster</a:t>
+            </a:r>
+          </a:p>
+          <a:p>
+            <a:pPr lvl="1"/>
             <a:r>
               <a:rPr lang="en-US" dirty="0"/>
-              <a:t> cluster</a:t>
-            </a:r>
-          </a:p>
-          <a:p>
-            <a:pPr lvl="1"/>
-            <a:r>
-              <a:rPr lang="en-US" dirty="0"/>
-              <a:t>Ensures 1 max master server, discovers tablet servers and handles their lifetime, stores </a:t>
-            </a:r>
-            <a:r>
-              <a:rPr lang="en-US" dirty="0" err="1"/>
-              <a:t>Bigtable</a:t>
-            </a:r>
-            <a:r>
-              <a:rPr lang="en-US" dirty="0"/>
-              <a:t> schema information, stores control lists</a:t>
+              <a:t>Ensures 1 max master server, discovers tablet servers and handles their lifetime, stores Bigtable schema information, stores control lists</a:t>
             </a:r>
           </a:p>
           <a:p>
@@ -6504,6 +6455,617 @@
     <p:extLst>
       <p:ext uri="{BB962C8B-B14F-4D97-AF65-F5344CB8AC3E}">
         <p14:creationId xmlns:p14="http://schemas.microsoft.com/office/powerpoint/2010/main" val="3359894840"/>
+      </p:ext>
+    </p:extLst>
+  </p:cSld>
+  <p:clrMapOvr>
+    <a:masterClrMapping/>
+  </p:clrMapOvr>
+  <p:timing>
+    <p:tnLst>
+      <p:par>
+        <p:cTn id="1" dur="indefinite" restart="never" nodeType="tmRoot"/>
+      </p:par>
+    </p:tnLst>
+  </p:timing>
+</p:sld>
+</file>
+
+<file path=ppt/slides/slide6.xml><?xml version="1.0" encoding="utf-8"?>
+<p:sld xmlns:a="http://schemas.openxmlformats.org/drawingml/2006/main" xmlns:r="http://schemas.openxmlformats.org/officeDocument/2006/relationships" xmlns:p="http://schemas.openxmlformats.org/presentationml/2006/main">
+  <p:cSld>
+    <p:spTree>
+      <p:nvGrpSpPr>
+        <p:cNvPr id="1" name=""/>
+        <p:cNvGrpSpPr/>
+        <p:nvPr/>
+      </p:nvGrpSpPr>
+      <p:grpSpPr>
+        <a:xfrm>
+          <a:off x="0" y="0"/>
+          <a:ext cx="0" cy="0"/>
+          <a:chOff x="0" y="0"/>
+          <a:chExt cx="0" cy="0"/>
+        </a:xfrm>
+      </p:grpSpPr>
+      <p:sp>
+        <p:nvSpPr>
+          <p:cNvPr id="2" name="Title 1"/>
+          <p:cNvSpPr>
+            <a:spLocks noGrp="1"/>
+          </p:cNvSpPr>
+          <p:nvPr>
+            <p:ph type="title"/>
+          </p:nvPr>
+        </p:nvSpPr>
+        <p:spPr/>
+        <p:txBody>
+          <a:bodyPr>
+            <a:normAutofit/>
+          </a:bodyPr>
+          <a:lstStyle/>
+          <a:p>
+            <a:r>
+              <a:rPr lang="en-US" sz="5000" dirty="0" smtClean="0"/>
+              <a:t>Bigtable: Analysis</a:t>
+            </a:r>
+            <a:endParaRPr lang="en-US" sz="5000" dirty="0"/>
+          </a:p>
+        </p:txBody>
+      </p:sp>
+      <p:sp>
+        <p:nvSpPr>
+          <p:cNvPr id="3" name="Content Placeholder 2"/>
+          <p:cNvSpPr>
+            <a:spLocks noGrp="1"/>
+          </p:cNvSpPr>
+          <p:nvPr>
+            <p:ph idx="1"/>
+          </p:nvPr>
+        </p:nvSpPr>
+        <p:spPr/>
+        <p:txBody>
+          <a:bodyPr/>
+          <a:lstStyle/>
+          <a:p>
+            <a:r>
+              <a:rPr lang="en-US" dirty="0" smtClean="0"/>
+              <a:t>Very interesting and complex implementation of a distributed storage system</a:t>
+            </a:r>
+          </a:p>
+          <a:p>
+            <a:pPr lvl="1"/>
+            <a:r>
+              <a:rPr lang="en-US" dirty="0" smtClean="0"/>
+              <a:t>Speeds and benchmarks were very impressive, as it only takes one single disk lookup</a:t>
+            </a:r>
+          </a:p>
+          <a:p>
+            <a:pPr lvl="2"/>
+            <a:r>
+              <a:rPr lang="en-US" dirty="0" smtClean="0"/>
+              <a:t>Use of a similar structure to a B+ tree is also nice, as having O(log n) lookup is impressive</a:t>
+            </a:r>
+          </a:p>
+          <a:p>
+            <a:r>
+              <a:rPr lang="en-US" dirty="0" smtClean="0"/>
+              <a:t>Allows the use of </a:t>
+            </a:r>
+            <a:r>
+              <a:rPr lang="en-US" dirty="0" err="1" smtClean="0"/>
+              <a:t>MapReduce</a:t>
+            </a:r>
+            <a:r>
+              <a:rPr lang="en-US" dirty="0" smtClean="0"/>
+              <a:t> and other Google systems to further increase performance, which is nice</a:t>
+            </a:r>
+          </a:p>
+          <a:p>
+            <a:r>
+              <a:rPr lang="en-US" dirty="0" smtClean="0"/>
+              <a:t>The automated system of managing the load of each tablet server and table size is impressive</a:t>
+            </a:r>
+          </a:p>
+          <a:p>
+            <a:pPr lvl="1"/>
+            <a:r>
+              <a:rPr lang="en-US" dirty="0" smtClean="0"/>
+              <a:t>Coordinating this all under a single master server is an incredible accomplishment, as well as the implementation of Chubby to help </a:t>
+            </a:r>
+            <a:r>
+              <a:rPr lang="en-US" dirty="0" smtClean="0"/>
+              <a:t>assist </a:t>
+            </a:r>
+            <a:r>
+              <a:rPr lang="en-US" dirty="0" smtClean="0"/>
+              <a:t>with this</a:t>
+            </a:r>
+            <a:endParaRPr lang="en-US" dirty="0"/>
+          </a:p>
+        </p:txBody>
+      </p:sp>
+    </p:spTree>
+    <p:extLst>
+      <p:ext uri="{BB962C8B-B14F-4D97-AF65-F5344CB8AC3E}">
+        <p14:creationId xmlns:p14="http://schemas.microsoft.com/office/powerpoint/2010/main" val="653199623"/>
+      </p:ext>
+    </p:extLst>
+  </p:cSld>
+  <p:clrMapOvr>
+    <a:masterClrMapping/>
+  </p:clrMapOvr>
+  <p:timing>
+    <p:tnLst>
+      <p:par>
+        <p:cTn id="1" dur="indefinite" restart="never" nodeType="tmRoot"/>
+      </p:par>
+    </p:tnLst>
+  </p:timing>
+</p:sld>
+</file>
+
+<file path=ppt/slides/slide7.xml><?xml version="1.0" encoding="utf-8"?>
+<p:sld xmlns:a="http://schemas.openxmlformats.org/drawingml/2006/main" xmlns:r="http://schemas.openxmlformats.org/officeDocument/2006/relationships" xmlns:p="http://schemas.openxmlformats.org/presentationml/2006/main">
+  <p:cSld>
+    <p:spTree>
+      <p:nvGrpSpPr>
+        <p:cNvPr id="1" name=""/>
+        <p:cNvGrpSpPr/>
+        <p:nvPr/>
+      </p:nvGrpSpPr>
+      <p:grpSpPr>
+        <a:xfrm>
+          <a:off x="0" y="0"/>
+          <a:ext cx="0" cy="0"/>
+          <a:chOff x="0" y="0"/>
+          <a:chExt cx="0" cy="0"/>
+        </a:xfrm>
+      </p:grpSpPr>
+      <p:sp>
+        <p:nvSpPr>
+          <p:cNvPr id="2" name="Title 1"/>
+          <p:cNvSpPr>
+            <a:spLocks noGrp="1"/>
+          </p:cNvSpPr>
+          <p:nvPr>
+            <p:ph type="title"/>
+          </p:nvPr>
+        </p:nvSpPr>
+        <p:spPr/>
+        <p:txBody>
+          <a:bodyPr>
+            <a:normAutofit/>
+          </a:bodyPr>
+          <a:lstStyle/>
+          <a:p>
+            <a:r>
+              <a:rPr lang="en-US" sz="5000" dirty="0" smtClean="0"/>
+              <a:t>Bigtable: Comparison</a:t>
+            </a:r>
+            <a:endParaRPr lang="en-US" sz="5000" dirty="0"/>
+          </a:p>
+        </p:txBody>
+      </p:sp>
+      <p:sp>
+        <p:nvSpPr>
+          <p:cNvPr id="3" name="Content Placeholder 2"/>
+          <p:cNvSpPr>
+            <a:spLocks noGrp="1"/>
+          </p:cNvSpPr>
+          <p:nvPr>
+            <p:ph idx="1"/>
+          </p:nvPr>
+        </p:nvSpPr>
+        <p:spPr/>
+        <p:txBody>
+          <a:bodyPr/>
+          <a:lstStyle/>
+          <a:p>
+            <a:r>
+              <a:rPr lang="en-US" dirty="0" smtClean="0"/>
+              <a:t>Bigtable is a offshoot of the parallel DBMS model with a mix of </a:t>
+            </a:r>
+            <a:r>
+              <a:rPr lang="en-US" dirty="0" err="1" smtClean="0"/>
+              <a:t>MapReduce</a:t>
+            </a:r>
+            <a:r>
+              <a:rPr lang="en-US" dirty="0" smtClean="0"/>
+              <a:t> features</a:t>
+            </a:r>
+          </a:p>
+          <a:p>
+            <a:pPr lvl="1"/>
+            <a:r>
+              <a:rPr lang="en-US" dirty="0" smtClean="0"/>
+              <a:t>Bigtable uses a distributed, multidimensional sorted map to store data</a:t>
+            </a:r>
+          </a:p>
+          <a:p>
+            <a:pPr lvl="1"/>
+            <a:r>
+              <a:rPr lang="en-US" dirty="0" smtClean="0"/>
+              <a:t>Can have </a:t>
+            </a:r>
+            <a:r>
+              <a:rPr lang="en-US" dirty="0" err="1" smtClean="0"/>
+              <a:t>MapReduce</a:t>
+            </a:r>
+            <a:r>
+              <a:rPr lang="en-US" dirty="0" smtClean="0"/>
+              <a:t> used on top of it for computations</a:t>
+            </a:r>
+          </a:p>
+          <a:p>
+            <a:pPr lvl="1"/>
+            <a:r>
+              <a:rPr lang="en-US" dirty="0" smtClean="0"/>
+              <a:t>Tablet recovery and management by master server similar to </a:t>
+            </a:r>
+            <a:r>
+              <a:rPr lang="en-US" dirty="0" err="1" smtClean="0"/>
+              <a:t>MapReduce</a:t>
+            </a:r>
+            <a:r>
+              <a:rPr lang="en-US" dirty="0" smtClean="0"/>
+              <a:t> reliability</a:t>
+            </a:r>
+          </a:p>
+          <a:p>
+            <a:r>
+              <a:rPr lang="en-US" dirty="0" smtClean="0"/>
+              <a:t>Has support for high-level queries</a:t>
+            </a:r>
+          </a:p>
+          <a:p>
+            <a:pPr lvl="1"/>
+            <a:r>
+              <a:rPr lang="en-US" dirty="0" smtClean="0"/>
+              <a:t>These queries are very fast, due to indexes and query planning / optimization, as well as being reliable</a:t>
+            </a:r>
+          </a:p>
+          <a:p>
+            <a:r>
+              <a:rPr lang="en-US" dirty="0" smtClean="0"/>
+              <a:t>Bigtable supports a schema defining data model, as opposed to that of </a:t>
+            </a:r>
+            <a:r>
+              <a:rPr lang="en-US" dirty="0" err="1" smtClean="0"/>
+              <a:t>MapReduces</a:t>
+            </a:r>
+            <a:r>
+              <a:rPr lang="en-US" dirty="0" smtClean="0"/>
+              <a:t> lack of schema</a:t>
+            </a:r>
+          </a:p>
+          <a:p>
+            <a:pPr lvl="1"/>
+            <a:r>
+              <a:rPr lang="en-US" dirty="0" smtClean="0"/>
+              <a:t>Provides for reliability, referential and data integrity, and easier access to data</a:t>
+            </a:r>
+          </a:p>
+          <a:p>
+            <a:endParaRPr lang="en-US" dirty="0" smtClean="0"/>
+          </a:p>
+          <a:p>
+            <a:endParaRPr lang="en-US" dirty="0"/>
+          </a:p>
+        </p:txBody>
+      </p:sp>
+    </p:spTree>
+    <p:extLst>
+      <p:ext uri="{BB962C8B-B14F-4D97-AF65-F5344CB8AC3E}">
+        <p14:creationId xmlns:p14="http://schemas.microsoft.com/office/powerpoint/2010/main" val="1434579321"/>
+      </p:ext>
+    </p:extLst>
+  </p:cSld>
+  <p:clrMapOvr>
+    <a:masterClrMapping/>
+  </p:clrMapOvr>
+  <p:timing>
+    <p:tnLst>
+      <p:par>
+        <p:cTn id="1" dur="indefinite" restart="never" nodeType="tmRoot"/>
+      </p:par>
+    </p:tnLst>
+  </p:timing>
+</p:sld>
+</file>
+
+<file path=ppt/slides/slide8.xml><?xml version="1.0" encoding="utf-8"?>
+<p:sld xmlns:a="http://schemas.openxmlformats.org/drawingml/2006/main" xmlns:r="http://schemas.openxmlformats.org/officeDocument/2006/relationships" xmlns:p="http://schemas.openxmlformats.org/presentationml/2006/main">
+  <p:cSld>
+    <p:spTree>
+      <p:nvGrpSpPr>
+        <p:cNvPr id="1" name=""/>
+        <p:cNvGrpSpPr/>
+        <p:nvPr/>
+      </p:nvGrpSpPr>
+      <p:grpSpPr>
+        <a:xfrm>
+          <a:off x="0" y="0"/>
+          <a:ext cx="0" cy="0"/>
+          <a:chOff x="0" y="0"/>
+          <a:chExt cx="0" cy="0"/>
+        </a:xfrm>
+      </p:grpSpPr>
+      <p:sp>
+        <p:nvSpPr>
+          <p:cNvPr id="2" name="Title 1"/>
+          <p:cNvSpPr>
+            <a:spLocks noGrp="1"/>
+          </p:cNvSpPr>
+          <p:nvPr>
+            <p:ph type="title"/>
+          </p:nvPr>
+        </p:nvSpPr>
+        <p:spPr>
+          <a:xfrm>
+            <a:off x="677334" y="609600"/>
+            <a:ext cx="9381066" cy="1320800"/>
+          </a:xfrm>
+        </p:spPr>
+        <p:txBody>
+          <a:bodyPr>
+            <a:noAutofit/>
+          </a:bodyPr>
+          <a:lstStyle/>
+          <a:p>
+            <a:r>
+              <a:rPr lang="en-US" sz="5000" dirty="0" smtClean="0"/>
+              <a:t>Bigtable: </a:t>
+            </a:r>
+            <a:br>
+              <a:rPr lang="en-US" sz="5000" dirty="0" smtClean="0"/>
+            </a:br>
+            <a:r>
+              <a:rPr lang="en-US" sz="5000" dirty="0" smtClean="0"/>
+              <a:t>Advantages and Disadvantages</a:t>
+            </a:r>
+            <a:endParaRPr lang="en-US" sz="5000" dirty="0"/>
+          </a:p>
+        </p:txBody>
+      </p:sp>
+      <p:sp>
+        <p:nvSpPr>
+          <p:cNvPr id="3" name="Content Placeholder 2"/>
+          <p:cNvSpPr>
+            <a:spLocks noGrp="1"/>
+          </p:cNvSpPr>
+          <p:nvPr>
+            <p:ph idx="1"/>
+          </p:nvPr>
+        </p:nvSpPr>
+        <p:spPr>
+          <a:xfrm>
+            <a:off x="677334" y="2385178"/>
+            <a:ext cx="8596668" cy="3880773"/>
+          </a:xfrm>
+        </p:spPr>
+        <p:txBody>
+          <a:bodyPr/>
+          <a:lstStyle/>
+          <a:p>
+            <a:r>
+              <a:rPr lang="en-US" dirty="0" smtClean="0"/>
+              <a:t>Advantages:</a:t>
+            </a:r>
+          </a:p>
+          <a:p>
+            <a:pPr lvl="1"/>
+            <a:r>
+              <a:rPr lang="en-US" dirty="0" smtClean="0"/>
+              <a:t>Performance advantages result of number of prominent technologies:</a:t>
+            </a:r>
+          </a:p>
+          <a:p>
+            <a:pPr lvl="2"/>
+            <a:r>
+              <a:rPr lang="en-US" dirty="0" smtClean="0"/>
+              <a:t>Indexes as B-trees to speed up access to data</a:t>
+            </a:r>
+          </a:p>
+          <a:p>
+            <a:pPr lvl="2"/>
+            <a:r>
+              <a:rPr lang="en-US" dirty="0" smtClean="0"/>
+              <a:t>Important storage mechanism, using a schema structure</a:t>
+            </a:r>
+          </a:p>
+          <a:p>
+            <a:pPr lvl="2"/>
+            <a:r>
+              <a:rPr lang="en-US" dirty="0" smtClean="0"/>
+              <a:t>Aggregation and query planning and optimizations</a:t>
+            </a:r>
+          </a:p>
+          <a:p>
+            <a:pPr lvl="1"/>
+            <a:r>
+              <a:rPr lang="en-US" dirty="0" smtClean="0"/>
+              <a:t>Amount of tools available and long history adds to its reliability as a system</a:t>
+            </a:r>
+          </a:p>
+          <a:p>
+            <a:pPr lvl="1"/>
+            <a:r>
+              <a:rPr lang="en-US" dirty="0" smtClean="0"/>
+              <a:t>Amount of disk I/O and hardware overhead of loading and accessing data is much lower for Parallel DBMS</a:t>
+            </a:r>
+          </a:p>
+          <a:p>
+            <a:pPr lvl="1"/>
+            <a:r>
+              <a:rPr lang="en-US" dirty="0" smtClean="0"/>
+              <a:t>Takes much less code to perform the equivalent </a:t>
+            </a:r>
+            <a:r>
+              <a:rPr lang="en-US" dirty="0" err="1" smtClean="0"/>
+              <a:t>MapReduce</a:t>
+            </a:r>
+            <a:r>
+              <a:rPr lang="en-US" dirty="0" smtClean="0"/>
+              <a:t> tasks</a:t>
+            </a:r>
+            <a:endParaRPr lang="en-US" dirty="0"/>
+          </a:p>
+        </p:txBody>
+      </p:sp>
+    </p:spTree>
+    <p:extLst>
+      <p:ext uri="{BB962C8B-B14F-4D97-AF65-F5344CB8AC3E}">
+        <p14:creationId xmlns:p14="http://schemas.microsoft.com/office/powerpoint/2010/main" val="3383411569"/>
+      </p:ext>
+    </p:extLst>
+  </p:cSld>
+  <p:clrMapOvr>
+    <a:masterClrMapping/>
+  </p:clrMapOvr>
+  <p:timing>
+    <p:tnLst>
+      <p:par>
+        <p:cTn id="1" dur="indefinite" restart="never" nodeType="tmRoot"/>
+      </p:par>
+    </p:tnLst>
+  </p:timing>
+</p:sld>
+</file>
+
+<file path=ppt/slides/slide9.xml><?xml version="1.0" encoding="utf-8"?>
+<p:sld xmlns:a="http://schemas.openxmlformats.org/drawingml/2006/main" xmlns:r="http://schemas.openxmlformats.org/officeDocument/2006/relationships" xmlns:p="http://schemas.openxmlformats.org/presentationml/2006/main">
+  <p:cSld>
+    <p:spTree>
+      <p:nvGrpSpPr>
+        <p:cNvPr id="1" name=""/>
+        <p:cNvGrpSpPr/>
+        <p:nvPr/>
+      </p:nvGrpSpPr>
+      <p:grpSpPr>
+        <a:xfrm>
+          <a:off x="0" y="0"/>
+          <a:ext cx="0" cy="0"/>
+          <a:chOff x="0" y="0"/>
+          <a:chExt cx="0" cy="0"/>
+        </a:xfrm>
+      </p:grpSpPr>
+      <p:sp>
+        <p:nvSpPr>
+          <p:cNvPr id="2" name="Title 1"/>
+          <p:cNvSpPr>
+            <a:spLocks noGrp="1"/>
+          </p:cNvSpPr>
+          <p:nvPr>
+            <p:ph type="title"/>
+          </p:nvPr>
+        </p:nvSpPr>
+        <p:spPr>
+          <a:xfrm>
+            <a:off x="677334" y="609600"/>
+            <a:ext cx="9381066" cy="1320800"/>
+          </a:xfrm>
+        </p:spPr>
+        <p:txBody>
+          <a:bodyPr>
+            <a:noAutofit/>
+          </a:bodyPr>
+          <a:lstStyle/>
+          <a:p>
+            <a:r>
+              <a:rPr lang="en-US" sz="5000" dirty="0" smtClean="0"/>
+              <a:t>Bigtable: </a:t>
+            </a:r>
+            <a:br>
+              <a:rPr lang="en-US" sz="5000" dirty="0" smtClean="0"/>
+            </a:br>
+            <a:r>
+              <a:rPr lang="en-US" sz="5000" dirty="0" smtClean="0"/>
+              <a:t>Advantages and Disadvantages</a:t>
+            </a:r>
+            <a:endParaRPr lang="en-US" sz="5000" dirty="0"/>
+          </a:p>
+        </p:txBody>
+      </p:sp>
+      <p:sp>
+        <p:nvSpPr>
+          <p:cNvPr id="3" name="Content Placeholder 2"/>
+          <p:cNvSpPr>
+            <a:spLocks noGrp="1"/>
+          </p:cNvSpPr>
+          <p:nvPr>
+            <p:ph idx="1"/>
+          </p:nvPr>
+        </p:nvSpPr>
+        <p:spPr>
+          <a:xfrm>
+            <a:off x="677334" y="2385178"/>
+            <a:ext cx="8596668" cy="3880773"/>
+          </a:xfrm>
+        </p:spPr>
+        <p:txBody>
+          <a:bodyPr/>
+          <a:lstStyle/>
+          <a:p>
+            <a:r>
+              <a:rPr lang="en-US" dirty="0" smtClean="0"/>
+              <a:t>Disadvantages:</a:t>
+            </a:r>
+          </a:p>
+          <a:p>
+            <a:pPr lvl="1"/>
+            <a:r>
+              <a:rPr lang="en-US" dirty="0" smtClean="0"/>
+              <a:t>Harder to configure and install the DBMS</a:t>
+            </a:r>
+          </a:p>
+          <a:p>
+            <a:pPr lvl="1"/>
+            <a:r>
+              <a:rPr lang="en-US" dirty="0" smtClean="0"/>
+              <a:t>Response to failure is much slower than that of </a:t>
+            </a:r>
+            <a:r>
+              <a:rPr lang="en-US" dirty="0" err="1" smtClean="0"/>
+              <a:t>MapReduce</a:t>
+            </a:r>
+            <a:endParaRPr lang="en-US" dirty="0" smtClean="0"/>
+          </a:p>
+          <a:p>
+            <a:pPr lvl="2"/>
+            <a:r>
+              <a:rPr lang="en-US" dirty="0" smtClean="0"/>
+              <a:t>Will restart long query after loss of just a single node in a cluster</a:t>
+            </a:r>
+          </a:p>
+          <a:p>
+            <a:pPr lvl="1"/>
+            <a:r>
+              <a:rPr lang="en-US" dirty="0" smtClean="0"/>
+              <a:t>Extensibility of the DBMS with user-defined types is limited</a:t>
+            </a:r>
+          </a:p>
+          <a:p>
+            <a:pPr lvl="1"/>
+            <a:r>
+              <a:rPr lang="en-US" dirty="0" smtClean="0"/>
+              <a:t>Lack of no proper SQL standard, as each DBMS is different with their own proprietary extensions</a:t>
+            </a:r>
+          </a:p>
+          <a:p>
+            <a:pPr lvl="1"/>
+            <a:endParaRPr lang="en-US" dirty="0" smtClean="0"/>
+          </a:p>
+          <a:p>
+            <a:pPr lvl="1"/>
+            <a:endParaRPr lang="en-US" dirty="0"/>
+          </a:p>
+        </p:txBody>
+      </p:sp>
+    </p:spTree>
+    <p:extLst>
+      <p:ext uri="{BB962C8B-B14F-4D97-AF65-F5344CB8AC3E}">
+        <p14:creationId xmlns:p14="http://schemas.microsoft.com/office/powerpoint/2010/main" val="3132133049"/>
       </p:ext>
     </p:extLst>
   </p:cSld>

</xml_diff>